<commit_message>
Organizando arquivos e diretórios
</commit_message>
<xml_diff>
--- a/Entregáveis/Entregável de PI - oficial.pptx
+++ b/Entregáveis/Entregável de PI - oficial.pptx
@@ -206,7 +206,7 @@
           <a:p>
             <a:fld id="{8AC79F10-E06E-4CE2-A9B4-B99BB230B28A}" type="datetimeFigureOut">
               <a:rPr lang="pt-BR" smtClean="0"/>
-              <a:t>06/03/2022</a:t>
+              <a:t>13/03/2022</a:t>
             </a:fld>
             <a:endParaRPr lang="pt-BR"/>
           </a:p>
@@ -9928,10 +9928,10 @@
       </p:grpSpPr>
       <p:pic>
         <p:nvPicPr>
-          <p:cNvPr id="7" name="Imagem 6">
-            <a:extLst>
-              <a:ext uri="{FF2B5EF4-FFF2-40B4-BE49-F238E27FC236}">
-                <a16:creationId xmlns:a16="http://schemas.microsoft.com/office/drawing/2014/main" id="{4BBA35FE-DD72-4D15-AB88-2F41FF6D8E47}"/>
+          <p:cNvPr id="4" name="Imagem 3">
+            <a:extLst>
+              <a:ext uri="{FF2B5EF4-FFF2-40B4-BE49-F238E27FC236}">
+                <a16:creationId xmlns:a16="http://schemas.microsoft.com/office/drawing/2014/main" id="{B3C09FFC-2A95-4B9F-9D15-9070B66BDE3A}"/>
               </a:ext>
             </a:extLst>
           </p:cNvPr>
@@ -9941,21 +9941,15 @@
           <p:nvPr/>
         </p:nvPicPr>
         <p:blipFill>
-          <a:blip r:embed="rId3">
-            <a:extLst>
-              <a:ext uri="{28A0092B-C50C-407E-A947-70E740481C1C}">
-                <a14:useLocalDpi xmlns:a14="http://schemas.microsoft.com/office/drawing/2010/main" val="0"/>
-              </a:ext>
-            </a:extLst>
-          </a:blip>
+          <a:blip r:embed="rId3"/>
           <a:stretch>
             <a:fillRect/>
           </a:stretch>
         </p:blipFill>
         <p:spPr>
           <a:xfrm>
-            <a:off x="-8324" y="0"/>
-            <a:ext cx="12208650" cy="6858000"/>
+            <a:off x="0" y="0"/>
+            <a:ext cx="12192000" cy="6858000"/>
           </a:xfrm>
           <a:prstGeom prst="rect">
             <a:avLst/>
@@ -13032,7 +13026,7 @@
 </file>
 
 <file path=customXml/itemProps1.xml><?xml version="1.0" encoding="utf-8"?>
-<ds:datastoreItem xmlns:ds="http://schemas.openxmlformats.org/officeDocument/2006/customXml" ds:itemID="{2B9E37B2-BF22-4497-90EF-CDCA3440008E}">
+<ds:datastoreItem xmlns:ds="http://schemas.openxmlformats.org/officeDocument/2006/customXml" ds:itemID="{89972C15-A741-472E-B305-DD97487358F0}">
   <ds:schemaRefs>
     <ds:schemaRef ds:uri="http://schemas.microsoft.com/VisualStudio/2011/storyboarding/control"/>
   </ds:schemaRefs>
@@ -13048,7 +13042,7 @@
 </file>
 
 <file path=customXml/itemProps3.xml><?xml version="1.0" encoding="utf-8"?>
-<ds:datastoreItem xmlns:ds="http://schemas.openxmlformats.org/officeDocument/2006/customXml" ds:itemID="{89972C15-A741-472E-B305-DD97487358F0}">
+<ds:datastoreItem xmlns:ds="http://schemas.openxmlformats.org/officeDocument/2006/customXml" ds:itemID="{2B9E37B2-BF22-4497-90EF-CDCA3440008E}">
   <ds:schemaRefs>
     <ds:schemaRef ds:uri="http://schemas.microsoft.com/VisualStudio/2011/storyboarding/control"/>
   </ds:schemaRefs>

</xml_diff>